<commit_message>
traducción figuras y tablas y formato APA de citas
</commit_message>
<xml_diff>
--- a/input/images/model.pptx
+++ b/input/images/model.pptx
@@ -6,6 +6,7 @@
   </p:sldMasterIdLst>
   <p:sldIdLst>
     <p:sldId id="257" r:id="rId2"/>
+    <p:sldId id="258" r:id="rId3"/>
   </p:sldIdLst>
   <p:sldSz cx="7993063" cy="4068763"/>
   <p:notesSz cx="6858000" cy="9144000"/>
@@ -243,7 +244,7 @@
           <a:p>
             <a:fld id="{7C809603-0A2B-4FAA-8CCA-C215CBD5387F}" type="datetimeFigureOut">
               <a:rPr lang="en-US" smtClean="0"/>
-              <a:t>3/14/2022</a:t>
+              <a:t>3/16/2022</a:t>
             </a:fld>
             <a:endParaRPr lang="en-US" dirty="0"/>
           </a:p>
@@ -413,7 +414,7 @@
           <a:p>
             <a:fld id="{7C809603-0A2B-4FAA-8CCA-C215CBD5387F}" type="datetimeFigureOut">
               <a:rPr lang="en-US" smtClean="0"/>
-              <a:t>3/14/2022</a:t>
+              <a:t>3/16/2022</a:t>
             </a:fld>
             <a:endParaRPr lang="en-US" dirty="0"/>
           </a:p>
@@ -593,7 +594,7 @@
           <a:p>
             <a:fld id="{7C809603-0A2B-4FAA-8CCA-C215CBD5387F}" type="datetimeFigureOut">
               <a:rPr lang="en-US" smtClean="0"/>
-              <a:t>3/14/2022</a:t>
+              <a:t>3/16/2022</a:t>
             </a:fld>
             <a:endParaRPr lang="en-US" dirty="0"/>
           </a:p>
@@ -763,7 +764,7 @@
           <a:p>
             <a:fld id="{7C809603-0A2B-4FAA-8CCA-C215CBD5387F}" type="datetimeFigureOut">
               <a:rPr lang="en-US" smtClean="0"/>
-              <a:t>3/14/2022</a:t>
+              <a:t>3/16/2022</a:t>
             </a:fld>
             <a:endParaRPr lang="en-US" dirty="0"/>
           </a:p>
@@ -1009,7 +1010,7 @@
           <a:p>
             <a:fld id="{7C809603-0A2B-4FAA-8CCA-C215CBD5387F}" type="datetimeFigureOut">
               <a:rPr lang="en-US" smtClean="0"/>
-              <a:t>3/14/2022</a:t>
+              <a:t>3/16/2022</a:t>
             </a:fld>
             <a:endParaRPr lang="en-US" dirty="0"/>
           </a:p>
@@ -1241,7 +1242,7 @@
           <a:p>
             <a:fld id="{7C809603-0A2B-4FAA-8CCA-C215CBD5387F}" type="datetimeFigureOut">
               <a:rPr lang="en-US" smtClean="0"/>
-              <a:t>3/14/2022</a:t>
+              <a:t>3/16/2022</a:t>
             </a:fld>
             <a:endParaRPr lang="en-US" dirty="0"/>
           </a:p>
@@ -1608,7 +1609,7 @@
           <a:p>
             <a:fld id="{7C809603-0A2B-4FAA-8CCA-C215CBD5387F}" type="datetimeFigureOut">
               <a:rPr lang="en-US" smtClean="0"/>
-              <a:t>3/14/2022</a:t>
+              <a:t>3/16/2022</a:t>
             </a:fld>
             <a:endParaRPr lang="en-US" dirty="0"/>
           </a:p>
@@ -1726,7 +1727,7 @@
           <a:p>
             <a:fld id="{7C809603-0A2B-4FAA-8CCA-C215CBD5387F}" type="datetimeFigureOut">
               <a:rPr lang="en-US" smtClean="0"/>
-              <a:t>3/14/2022</a:t>
+              <a:t>3/16/2022</a:t>
             </a:fld>
             <a:endParaRPr lang="en-US" dirty="0"/>
           </a:p>
@@ -1821,7 +1822,7 @@
           <a:p>
             <a:fld id="{7C809603-0A2B-4FAA-8CCA-C215CBD5387F}" type="datetimeFigureOut">
               <a:rPr lang="en-US" smtClean="0"/>
-              <a:t>3/14/2022</a:t>
+              <a:t>3/16/2022</a:t>
             </a:fld>
             <a:endParaRPr lang="en-US" dirty="0"/>
           </a:p>
@@ -2098,7 +2099,7 @@
           <a:p>
             <a:fld id="{7C809603-0A2B-4FAA-8CCA-C215CBD5387F}" type="datetimeFigureOut">
               <a:rPr lang="en-US" smtClean="0"/>
-              <a:t>3/14/2022</a:t>
+              <a:t>3/16/2022</a:t>
             </a:fld>
             <a:endParaRPr lang="en-US" dirty="0"/>
           </a:p>
@@ -2355,7 +2356,7 @@
           <a:p>
             <a:fld id="{7C809603-0A2B-4FAA-8CCA-C215CBD5387F}" type="datetimeFigureOut">
               <a:rPr lang="en-US" smtClean="0"/>
-              <a:t>3/14/2022</a:t>
+              <a:t>3/16/2022</a:t>
             </a:fld>
             <a:endParaRPr lang="en-US" dirty="0"/>
           </a:p>
@@ -2568,7 +2569,7 @@
           <a:p>
             <a:fld id="{7C809603-0A2B-4FAA-8CCA-C215CBD5387F}" type="datetimeFigureOut">
               <a:rPr lang="en-US" smtClean="0"/>
-              <a:t>3/14/2022</a:t>
+              <a:t>3/16/2022</a:t>
             </a:fld>
             <a:endParaRPr lang="en-US" dirty="0"/>
           </a:p>
@@ -3902,6 +3903,863 @@
 </p:sld>
 </file>
 
+<file path=ppt/slides/slide2.xml><?xml version="1.0" encoding="utf-8"?>
+<p:sld xmlns:a="http://schemas.openxmlformats.org/drawingml/2006/main" xmlns:r="http://schemas.openxmlformats.org/officeDocument/2006/relationships" xmlns:p="http://schemas.openxmlformats.org/presentationml/2006/main">
+  <p:cSld>
+    <p:spTree>
+      <p:nvGrpSpPr>
+        <p:cNvPr id="1" name=""/>
+        <p:cNvGrpSpPr/>
+        <p:nvPr/>
+      </p:nvGrpSpPr>
+      <p:grpSpPr>
+        <a:xfrm>
+          <a:off x="0" y="0"/>
+          <a:ext cx="0" cy="0"/>
+          <a:chOff x="0" y="0"/>
+          <a:chExt cx="0" cy="0"/>
+        </a:xfrm>
+      </p:grpSpPr>
+      <p:sp>
+        <p:nvSpPr>
+          <p:cNvPr id="5" name="Rectángulo 4"/>
+          <p:cNvSpPr/>
+          <p:nvPr/>
+        </p:nvSpPr>
+        <p:spPr>
+          <a:xfrm>
+            <a:off x="556895" y="3467443"/>
+            <a:ext cx="1236937" cy="419357"/>
+          </a:xfrm>
+          <a:prstGeom prst="rect">
+            <a:avLst/>
+          </a:prstGeom>
+        </p:spPr>
+        <p:style>
+          <a:lnRef idx="2">
+            <a:schemeClr val="dk1"/>
+          </a:lnRef>
+          <a:fillRef idx="1">
+            <a:schemeClr val="lt1"/>
+          </a:fillRef>
+          <a:effectRef idx="0">
+            <a:schemeClr val="dk1"/>
+          </a:effectRef>
+          <a:fontRef idx="minor">
+            <a:schemeClr val="dk1"/>
+          </a:fontRef>
+        </p:style>
+        <p:txBody>
+          <a:bodyPr rot="0" spcFirstLastPara="0" vertOverflow="overflow" horzOverflow="overflow" vert="horz" wrap="square" lIns="65341" tIns="32671" rIns="65341" bIns="32671" numCol="1" spcCol="0" rtlCol="0" fromWordArt="0" anchor="ctr" anchorCtr="0" forceAA="0" compatLnSpc="1">
+            <a:prstTxWarp prst="textNoShape">
+              <a:avLst/>
+            </a:prstTxWarp>
+            <a:noAutofit/>
+          </a:bodyPr>
+          <a:lstStyle/>
+          <a:p>
+            <a:pPr algn="ctr"/>
+            <a:r>
+              <a:rPr lang="en-GB" sz="900" dirty="0">
+                <a:latin typeface="Times New Roman" panose="02020603050405020304" pitchFamily="18" charset="0"/>
+                <a:cs typeface="Times New Roman" panose="02020603050405020304" pitchFamily="18" charset="0"/>
+              </a:rPr>
+              <a:t>Family Socioeconomic Status</a:t>
+            </a:r>
+          </a:p>
+        </p:txBody>
+      </p:sp>
+      <p:sp>
+        <p:nvSpPr>
+          <p:cNvPr id="7" name="Rectángulo 6"/>
+          <p:cNvSpPr/>
+          <p:nvPr/>
+        </p:nvSpPr>
+        <p:spPr>
+          <a:xfrm>
+            <a:off x="6011568" y="2432290"/>
+            <a:ext cx="1236937" cy="419357"/>
+          </a:xfrm>
+          <a:prstGeom prst="rect">
+            <a:avLst/>
+          </a:prstGeom>
+        </p:spPr>
+        <p:style>
+          <a:lnRef idx="2">
+            <a:schemeClr val="dk1"/>
+          </a:lnRef>
+          <a:fillRef idx="1">
+            <a:schemeClr val="lt1"/>
+          </a:fillRef>
+          <a:effectRef idx="0">
+            <a:schemeClr val="dk1"/>
+          </a:effectRef>
+          <a:fontRef idx="minor">
+            <a:schemeClr val="dk1"/>
+          </a:fontRef>
+        </p:style>
+        <p:txBody>
+          <a:bodyPr rot="0" spcFirstLastPara="0" vertOverflow="overflow" horzOverflow="overflow" vert="horz" wrap="square" lIns="65341" tIns="32671" rIns="65341" bIns="32671" numCol="1" spcCol="0" rtlCol="0" fromWordArt="0" anchor="ctr" anchorCtr="0" forceAA="0" compatLnSpc="1">
+            <a:prstTxWarp prst="textNoShape">
+              <a:avLst/>
+            </a:prstTxWarp>
+            <a:noAutofit/>
+          </a:bodyPr>
+          <a:lstStyle/>
+          <a:p>
+            <a:pPr algn="ctr"/>
+            <a:r>
+              <a:rPr lang="en-US" sz="900" dirty="0">
+                <a:latin typeface="Times New Roman" panose="02020603050405020304" pitchFamily="18" charset="0"/>
+                <a:cs typeface="Times New Roman" panose="02020603050405020304" pitchFamily="18" charset="0"/>
+              </a:rPr>
+              <a:t>Perception of Meritocracy - students</a:t>
+            </a:r>
+          </a:p>
+        </p:txBody>
+      </p:sp>
+      <p:cxnSp>
+        <p:nvCxnSpPr>
+          <p:cNvPr id="9" name="Conector recto de flecha 8"/>
+          <p:cNvCxnSpPr>
+            <a:cxnSpLocks/>
+            <a:stCxn id="5" idx="3"/>
+            <a:endCxn id="7" idx="1"/>
+          </p:cNvCxnSpPr>
+          <p:nvPr/>
+        </p:nvCxnSpPr>
+        <p:spPr>
+          <a:xfrm flipV="1">
+            <a:off x="1793832" y="2641969"/>
+            <a:ext cx="4217736" cy="1035153"/>
+          </a:xfrm>
+          <a:prstGeom prst="straightConnector1">
+            <a:avLst/>
+          </a:prstGeom>
+          <a:ln>
+            <a:tailEnd type="triangle"/>
+          </a:ln>
+        </p:spPr>
+        <p:style>
+          <a:lnRef idx="3">
+            <a:schemeClr val="dk1"/>
+          </a:lnRef>
+          <a:fillRef idx="0">
+            <a:schemeClr val="dk1"/>
+          </a:fillRef>
+          <a:effectRef idx="2">
+            <a:schemeClr val="dk1"/>
+          </a:effectRef>
+          <a:fontRef idx="minor">
+            <a:schemeClr val="tx1"/>
+          </a:fontRef>
+        </p:style>
+      </p:cxnSp>
+      <p:sp>
+        <p:nvSpPr>
+          <p:cNvPr id="16" name="Rectángulo 15"/>
+          <p:cNvSpPr/>
+          <p:nvPr/>
+        </p:nvSpPr>
+        <p:spPr>
+          <a:xfrm>
+            <a:off x="580976" y="1490754"/>
+            <a:ext cx="1236938" cy="419357"/>
+          </a:xfrm>
+          <a:prstGeom prst="rect">
+            <a:avLst/>
+          </a:prstGeom>
+        </p:spPr>
+        <p:style>
+          <a:lnRef idx="2">
+            <a:schemeClr val="dk1"/>
+          </a:lnRef>
+          <a:fillRef idx="1">
+            <a:schemeClr val="lt1"/>
+          </a:fillRef>
+          <a:effectRef idx="0">
+            <a:schemeClr val="dk1"/>
+          </a:effectRef>
+          <a:fontRef idx="minor">
+            <a:schemeClr val="dk1"/>
+          </a:fontRef>
+        </p:style>
+        <p:txBody>
+          <a:bodyPr rot="0" spcFirstLastPara="0" vertOverflow="overflow" horzOverflow="overflow" vert="horz" wrap="square" lIns="65341" tIns="32671" rIns="65341" bIns="32671" numCol="1" spcCol="0" rtlCol="0" fromWordArt="0" anchor="ctr" anchorCtr="0" forceAA="0" compatLnSpc="1">
+            <a:prstTxWarp prst="textNoShape">
+              <a:avLst/>
+            </a:prstTxWarp>
+            <a:noAutofit/>
+          </a:bodyPr>
+          <a:lstStyle/>
+          <a:p>
+            <a:pPr algn="ctr"/>
+            <a:r>
+              <a:rPr lang="en-US" sz="1000" dirty="0">
+                <a:latin typeface="Times New Roman" panose="02020603050405020304" pitchFamily="18" charset="0"/>
+                <a:cs typeface="Times New Roman" panose="02020603050405020304" pitchFamily="18" charset="0"/>
+              </a:rPr>
+              <a:t>Perception of Meritocracy - Parents</a:t>
+            </a:r>
+          </a:p>
+        </p:txBody>
+      </p:sp>
+      <p:cxnSp>
+        <p:nvCxnSpPr>
+          <p:cNvPr id="43" name="Conector recto 42"/>
+          <p:cNvCxnSpPr/>
+          <p:nvPr/>
+        </p:nvCxnSpPr>
+        <p:spPr>
+          <a:xfrm>
+            <a:off x="580975" y="951625"/>
+            <a:ext cx="6770852" cy="30784"/>
+          </a:xfrm>
+          <a:prstGeom prst="line">
+            <a:avLst/>
+          </a:prstGeom>
+          <a:ln w="12700" cap="flat" cmpd="sng" algn="ctr">
+            <a:solidFill>
+              <a:schemeClr val="dk1"/>
+            </a:solidFill>
+            <a:prstDash val="dash"/>
+            <a:round/>
+            <a:headEnd type="none" w="med" len="med"/>
+            <a:tailEnd type="none" w="med" len="med"/>
+          </a:ln>
+        </p:spPr>
+        <p:style>
+          <a:lnRef idx="0">
+            <a:scrgbClr r="0" g="0" b="0"/>
+          </a:lnRef>
+          <a:fillRef idx="0">
+            <a:scrgbClr r="0" g="0" b="0"/>
+          </a:fillRef>
+          <a:effectRef idx="0">
+            <a:scrgbClr r="0" g="0" b="0"/>
+          </a:effectRef>
+          <a:fontRef idx="minor">
+            <a:schemeClr val="tx1"/>
+          </a:fontRef>
+        </p:style>
+      </p:cxnSp>
+      <p:sp>
+        <p:nvSpPr>
+          <p:cNvPr id="47" name="Rectángulo 46"/>
+          <p:cNvSpPr/>
+          <p:nvPr/>
+        </p:nvSpPr>
+        <p:spPr>
+          <a:xfrm>
+            <a:off x="2991442" y="217750"/>
+            <a:ext cx="1363425" cy="419357"/>
+          </a:xfrm>
+          <a:prstGeom prst="rect">
+            <a:avLst/>
+          </a:prstGeom>
+        </p:spPr>
+        <p:style>
+          <a:lnRef idx="2">
+            <a:schemeClr val="dk1"/>
+          </a:lnRef>
+          <a:fillRef idx="1">
+            <a:schemeClr val="lt1"/>
+          </a:fillRef>
+          <a:effectRef idx="0">
+            <a:schemeClr val="dk1"/>
+          </a:effectRef>
+          <a:fontRef idx="minor">
+            <a:schemeClr val="dk1"/>
+          </a:fontRef>
+        </p:style>
+        <p:txBody>
+          <a:bodyPr rot="0" spcFirstLastPara="0" vertOverflow="overflow" horzOverflow="overflow" vert="horz" wrap="square" lIns="65341" tIns="32671" rIns="65341" bIns="32671" numCol="1" spcCol="0" rtlCol="0" fromWordArt="0" anchor="ctr" anchorCtr="0" forceAA="0" compatLnSpc="1">
+            <a:prstTxWarp prst="textNoShape">
+              <a:avLst/>
+            </a:prstTxWarp>
+            <a:noAutofit/>
+          </a:bodyPr>
+          <a:lstStyle/>
+          <a:p>
+            <a:pPr algn="ctr"/>
+            <a:r>
+              <a:rPr lang="en-GB" sz="1286" dirty="0">
+                <a:latin typeface="Times New Roman" panose="02020603050405020304" pitchFamily="18" charset="0"/>
+                <a:cs typeface="Times New Roman" panose="02020603050405020304" pitchFamily="18" charset="0"/>
+              </a:rPr>
+              <a:t>Socioeconomic status</a:t>
+            </a:r>
+          </a:p>
+        </p:txBody>
+      </p:sp>
+      <p:sp>
+        <p:nvSpPr>
+          <p:cNvPr id="53" name="Rectángulo 52"/>
+          <p:cNvSpPr/>
+          <p:nvPr/>
+        </p:nvSpPr>
+        <p:spPr>
+          <a:xfrm>
+            <a:off x="583613" y="720328"/>
+            <a:ext cx="913065" cy="160984"/>
+          </a:xfrm>
+          <a:prstGeom prst="rect">
+            <a:avLst/>
+          </a:prstGeom>
+          <a:noFill/>
+          <a:ln>
+            <a:noFill/>
+          </a:ln>
+        </p:spPr>
+        <p:style>
+          <a:lnRef idx="0">
+            <a:scrgbClr r="0" g="0" b="0"/>
+          </a:lnRef>
+          <a:fillRef idx="0">
+            <a:scrgbClr r="0" g="0" b="0"/>
+          </a:fillRef>
+          <a:effectRef idx="0">
+            <a:scrgbClr r="0" g="0" b="0"/>
+          </a:effectRef>
+          <a:fontRef idx="minor">
+            <a:schemeClr val="dk1"/>
+          </a:fontRef>
+        </p:style>
+        <p:txBody>
+          <a:bodyPr rot="0" spcFirstLastPara="0" vertOverflow="overflow" horzOverflow="overflow" vert="horz" wrap="square" lIns="65341" tIns="32671" rIns="65341" bIns="32671" numCol="1" spcCol="0" rtlCol="0" fromWordArt="0" anchor="ctr" anchorCtr="0" forceAA="0" compatLnSpc="1">
+            <a:prstTxWarp prst="textNoShape">
+              <a:avLst/>
+            </a:prstTxWarp>
+            <a:noAutofit/>
+          </a:bodyPr>
+          <a:lstStyle/>
+          <a:p>
+            <a:r>
+              <a:rPr lang="en-GB" sz="858" dirty="0">
+                <a:latin typeface="Times New Roman" panose="02020603050405020304" pitchFamily="18" charset="0"/>
+                <a:cs typeface="Times New Roman" panose="02020603050405020304" pitchFamily="18" charset="0"/>
+              </a:rPr>
+              <a:t>Level</a:t>
+            </a:r>
+            <a:r>
+              <a:rPr lang="es-CL" sz="858" dirty="0">
+                <a:latin typeface="Times New Roman" panose="02020603050405020304" pitchFamily="18" charset="0"/>
+                <a:cs typeface="Times New Roman" panose="02020603050405020304" pitchFamily="18" charset="0"/>
+              </a:rPr>
+              <a:t> 2: </a:t>
+            </a:r>
+            <a:r>
+              <a:rPr lang="es-CL" sz="858" dirty="0" err="1">
+                <a:latin typeface="Times New Roman" panose="02020603050405020304" pitchFamily="18" charset="0"/>
+                <a:cs typeface="Times New Roman" panose="02020603050405020304" pitchFamily="18" charset="0"/>
+              </a:rPr>
+              <a:t>School</a:t>
+            </a:r>
+            <a:endParaRPr lang="en-US" sz="858" dirty="0">
+              <a:latin typeface="Times New Roman" panose="02020603050405020304" pitchFamily="18" charset="0"/>
+              <a:cs typeface="Times New Roman" panose="02020603050405020304" pitchFamily="18" charset="0"/>
+            </a:endParaRPr>
+          </a:p>
+        </p:txBody>
+      </p:sp>
+      <p:sp>
+        <p:nvSpPr>
+          <p:cNvPr id="54" name="Rectángulo 53"/>
+          <p:cNvSpPr/>
+          <p:nvPr/>
+        </p:nvSpPr>
+        <p:spPr>
+          <a:xfrm>
+            <a:off x="583618" y="1007966"/>
+            <a:ext cx="1081280" cy="144126"/>
+          </a:xfrm>
+          <a:prstGeom prst="rect">
+            <a:avLst/>
+          </a:prstGeom>
+          <a:noFill/>
+          <a:ln>
+            <a:noFill/>
+          </a:ln>
+        </p:spPr>
+        <p:style>
+          <a:lnRef idx="0">
+            <a:scrgbClr r="0" g="0" b="0"/>
+          </a:lnRef>
+          <a:fillRef idx="0">
+            <a:scrgbClr r="0" g="0" b="0"/>
+          </a:fillRef>
+          <a:effectRef idx="0">
+            <a:scrgbClr r="0" g="0" b="0"/>
+          </a:effectRef>
+          <a:fontRef idx="minor">
+            <a:schemeClr val="dk1"/>
+          </a:fontRef>
+        </p:style>
+        <p:txBody>
+          <a:bodyPr rot="0" spcFirstLastPara="0" vertOverflow="overflow" horzOverflow="overflow" vert="horz" wrap="square" lIns="65341" tIns="32671" rIns="65341" bIns="32671" numCol="1" spcCol="0" rtlCol="0" fromWordArt="0" anchor="ctr" anchorCtr="0" forceAA="0" compatLnSpc="1">
+            <a:prstTxWarp prst="textNoShape">
+              <a:avLst/>
+            </a:prstTxWarp>
+            <a:noAutofit/>
+          </a:bodyPr>
+          <a:lstStyle/>
+          <a:p>
+            <a:r>
+              <a:rPr lang="es-CL" sz="858" dirty="0" err="1">
+                <a:latin typeface="Times New Roman" panose="02020603050405020304" pitchFamily="18" charset="0"/>
+                <a:cs typeface="Times New Roman" panose="02020603050405020304" pitchFamily="18" charset="0"/>
+              </a:rPr>
+              <a:t>Level</a:t>
+            </a:r>
+            <a:r>
+              <a:rPr lang="es-CL" sz="858" dirty="0">
+                <a:latin typeface="Times New Roman" panose="02020603050405020304" pitchFamily="18" charset="0"/>
+                <a:cs typeface="Times New Roman" panose="02020603050405020304" pitchFamily="18" charset="0"/>
+              </a:rPr>
+              <a:t> 1: </a:t>
+            </a:r>
+            <a:r>
+              <a:rPr lang="es-CL" sz="858" dirty="0" err="1">
+                <a:latin typeface="Times New Roman" panose="02020603050405020304" pitchFamily="18" charset="0"/>
+                <a:cs typeface="Times New Roman" panose="02020603050405020304" pitchFamily="18" charset="0"/>
+              </a:rPr>
+              <a:t>student</a:t>
+            </a:r>
+            <a:endParaRPr lang="en-US" sz="858" dirty="0">
+              <a:latin typeface="Times New Roman" panose="02020603050405020304" pitchFamily="18" charset="0"/>
+              <a:cs typeface="Times New Roman" panose="02020603050405020304" pitchFamily="18" charset="0"/>
+            </a:endParaRPr>
+          </a:p>
+        </p:txBody>
+      </p:sp>
+      <p:cxnSp>
+        <p:nvCxnSpPr>
+          <p:cNvPr id="28" name="Conector recto de flecha 27">
+            <a:extLst>
+              <a:ext uri="{FF2B5EF4-FFF2-40B4-BE49-F238E27FC236}">
+                <a16:creationId xmlns:a16="http://schemas.microsoft.com/office/drawing/2014/main" id="{D8263876-9E38-4092-B576-3173BEFF76E8}"/>
+              </a:ext>
+            </a:extLst>
+          </p:cNvPr>
+          <p:cNvCxnSpPr>
+            <a:cxnSpLocks/>
+            <a:stCxn id="16" idx="3"/>
+            <a:endCxn id="7" idx="1"/>
+          </p:cNvCxnSpPr>
+          <p:nvPr/>
+        </p:nvCxnSpPr>
+        <p:spPr>
+          <a:xfrm>
+            <a:off x="1817914" y="1700433"/>
+            <a:ext cx="4193654" cy="941536"/>
+          </a:xfrm>
+          <a:prstGeom prst="straightConnector1">
+            <a:avLst/>
+          </a:prstGeom>
+          <a:ln>
+            <a:tailEnd type="triangle"/>
+          </a:ln>
+        </p:spPr>
+        <p:style>
+          <a:lnRef idx="3">
+            <a:schemeClr val="dk1"/>
+          </a:lnRef>
+          <a:fillRef idx="0">
+            <a:schemeClr val="dk1"/>
+          </a:fillRef>
+          <a:effectRef idx="2">
+            <a:schemeClr val="dk1"/>
+          </a:effectRef>
+          <a:fontRef idx="minor">
+            <a:schemeClr val="tx1"/>
+          </a:fontRef>
+        </p:style>
+      </p:cxnSp>
+      <p:cxnSp>
+        <p:nvCxnSpPr>
+          <p:cNvPr id="32" name="Conector recto de flecha 31">
+            <a:extLst>
+              <a:ext uri="{FF2B5EF4-FFF2-40B4-BE49-F238E27FC236}">
+                <a16:creationId xmlns:a16="http://schemas.microsoft.com/office/drawing/2014/main" id="{009492D7-2D96-4951-940C-FDCFDF0BA75A}"/>
+              </a:ext>
+            </a:extLst>
+          </p:cNvPr>
+          <p:cNvCxnSpPr>
+            <a:cxnSpLocks/>
+            <a:stCxn id="47" idx="2"/>
+            <a:endCxn id="7" idx="1"/>
+          </p:cNvCxnSpPr>
+          <p:nvPr/>
+        </p:nvCxnSpPr>
+        <p:spPr>
+          <a:xfrm>
+            <a:off x="3673155" y="637107"/>
+            <a:ext cx="2338413" cy="2004862"/>
+          </a:xfrm>
+          <a:prstGeom prst="straightConnector1">
+            <a:avLst/>
+          </a:prstGeom>
+          <a:ln>
+            <a:tailEnd type="triangle"/>
+          </a:ln>
+        </p:spPr>
+        <p:style>
+          <a:lnRef idx="3">
+            <a:schemeClr val="dk1"/>
+          </a:lnRef>
+          <a:fillRef idx="0">
+            <a:schemeClr val="dk1"/>
+          </a:fillRef>
+          <a:effectRef idx="2">
+            <a:schemeClr val="dk1"/>
+          </a:effectRef>
+          <a:fontRef idx="minor">
+            <a:schemeClr val="tx1"/>
+          </a:fontRef>
+        </p:style>
+      </p:cxnSp>
+      <p:sp>
+        <p:nvSpPr>
+          <p:cNvPr id="39" name="CuadroTexto 38">
+            <a:extLst>
+              <a:ext uri="{FF2B5EF4-FFF2-40B4-BE49-F238E27FC236}">
+                <a16:creationId xmlns:a16="http://schemas.microsoft.com/office/drawing/2014/main" id="{6B4026CC-CFF3-4524-B7AF-7D9F1475EF49}"/>
+              </a:ext>
+            </a:extLst>
+          </p:cNvPr>
+          <p:cNvSpPr txBox="1"/>
+          <p:nvPr/>
+        </p:nvSpPr>
+        <p:spPr>
+          <a:xfrm>
+            <a:off x="3037880" y="1635842"/>
+            <a:ext cx="681713" cy="307777"/>
+          </a:xfrm>
+          <a:prstGeom prst="rect">
+            <a:avLst/>
+          </a:prstGeom>
+          <a:noFill/>
+        </p:spPr>
+        <p:txBody>
+          <a:bodyPr wrap="square" rtlCol="0">
+            <a:spAutoFit/>
+          </a:bodyPr>
+          <a:lstStyle/>
+          <a:p>
+            <a:r>
+              <a:rPr lang="en-GB" sz="1400" dirty="0">
+                <a:latin typeface="Times New Roman" panose="02020603050405020304" pitchFamily="18" charset="0"/>
+                <a:cs typeface="Times New Roman" panose="02020603050405020304" pitchFamily="18" charset="0"/>
+              </a:rPr>
+              <a:t>H1</a:t>
+            </a:r>
+          </a:p>
+        </p:txBody>
+      </p:sp>
+      <p:sp>
+        <p:nvSpPr>
+          <p:cNvPr id="44" name="CuadroTexto 43">
+            <a:extLst>
+              <a:ext uri="{FF2B5EF4-FFF2-40B4-BE49-F238E27FC236}">
+                <a16:creationId xmlns:a16="http://schemas.microsoft.com/office/drawing/2014/main" id="{163422A8-AB09-407D-92B2-AD76719E6A46}"/>
+              </a:ext>
+            </a:extLst>
+          </p:cNvPr>
+          <p:cNvSpPr txBox="1"/>
+          <p:nvPr/>
+        </p:nvSpPr>
+        <p:spPr>
+          <a:xfrm>
+            <a:off x="5097936" y="1537083"/>
+            <a:ext cx="734378" cy="307777"/>
+          </a:xfrm>
+          <a:prstGeom prst="rect">
+            <a:avLst/>
+          </a:prstGeom>
+          <a:noFill/>
+        </p:spPr>
+        <p:txBody>
+          <a:bodyPr wrap="square" rtlCol="0">
+            <a:spAutoFit/>
+          </a:bodyPr>
+          <a:lstStyle/>
+          <a:p>
+            <a:r>
+              <a:rPr lang="en-GB" sz="1400" dirty="0">
+                <a:latin typeface="Times New Roman" panose="02020603050405020304" pitchFamily="18" charset="0"/>
+                <a:cs typeface="Times New Roman" panose="02020603050405020304" pitchFamily="18" charset="0"/>
+              </a:rPr>
+              <a:t>H5</a:t>
+            </a:r>
+          </a:p>
+        </p:txBody>
+      </p:sp>
+      <p:sp>
+        <p:nvSpPr>
+          <p:cNvPr id="24" name="Rectángulo 15">
+            <a:extLst>
+              <a:ext uri="{FF2B5EF4-FFF2-40B4-BE49-F238E27FC236}">
+                <a16:creationId xmlns:a16="http://schemas.microsoft.com/office/drawing/2014/main" id="{BBAB952C-A524-4CEC-9C16-2536E74824AE}"/>
+              </a:ext>
+            </a:extLst>
+          </p:cNvPr>
+          <p:cNvSpPr/>
+          <p:nvPr/>
+        </p:nvSpPr>
+        <p:spPr>
+          <a:xfrm>
+            <a:off x="580975" y="2476052"/>
+            <a:ext cx="1236938" cy="419357"/>
+          </a:xfrm>
+          <a:prstGeom prst="rect">
+            <a:avLst/>
+          </a:prstGeom>
+        </p:spPr>
+        <p:style>
+          <a:lnRef idx="2">
+            <a:schemeClr val="dk1"/>
+          </a:lnRef>
+          <a:fillRef idx="1">
+            <a:schemeClr val="lt1"/>
+          </a:fillRef>
+          <a:effectRef idx="0">
+            <a:schemeClr val="dk1"/>
+          </a:effectRef>
+          <a:fontRef idx="minor">
+            <a:schemeClr val="dk1"/>
+          </a:fontRef>
+        </p:style>
+        <p:txBody>
+          <a:bodyPr rot="0" spcFirstLastPara="0" vertOverflow="overflow" horzOverflow="overflow" vert="horz" wrap="square" lIns="65341" tIns="32671" rIns="65341" bIns="32671" numCol="1" spcCol="0" rtlCol="0" fromWordArt="0" anchor="ctr" anchorCtr="0" forceAA="0" compatLnSpc="1">
+            <a:prstTxWarp prst="textNoShape">
+              <a:avLst/>
+            </a:prstTxWarp>
+            <a:noAutofit/>
+          </a:bodyPr>
+          <a:lstStyle/>
+          <a:p>
+            <a:pPr algn="ctr"/>
+            <a:r>
+              <a:rPr lang="en-US" sz="1000" dirty="0">
+                <a:latin typeface="Times New Roman" panose="02020603050405020304" pitchFamily="18" charset="0"/>
+                <a:cs typeface="Times New Roman" panose="02020603050405020304" pitchFamily="18" charset="0"/>
+              </a:rPr>
+              <a:t>Sense of Justice in Grades</a:t>
+            </a:r>
+          </a:p>
+        </p:txBody>
+      </p:sp>
+      <p:cxnSp>
+        <p:nvCxnSpPr>
+          <p:cNvPr id="26" name="Conector recto de flecha 27">
+            <a:extLst>
+              <a:ext uri="{FF2B5EF4-FFF2-40B4-BE49-F238E27FC236}">
+                <a16:creationId xmlns:a16="http://schemas.microsoft.com/office/drawing/2014/main" id="{B5DA4CE6-2DD7-4BC1-80CD-EECDDC659001}"/>
+              </a:ext>
+            </a:extLst>
+          </p:cNvPr>
+          <p:cNvCxnSpPr>
+            <a:cxnSpLocks/>
+            <a:stCxn id="24" idx="3"/>
+            <a:endCxn id="7" idx="1"/>
+          </p:cNvCxnSpPr>
+          <p:nvPr/>
+        </p:nvCxnSpPr>
+        <p:spPr>
+          <a:xfrm flipV="1">
+            <a:off x="1817913" y="2641969"/>
+            <a:ext cx="4193655" cy="43762"/>
+          </a:xfrm>
+          <a:prstGeom prst="straightConnector1">
+            <a:avLst/>
+          </a:prstGeom>
+          <a:ln>
+            <a:tailEnd type="triangle"/>
+          </a:ln>
+        </p:spPr>
+        <p:style>
+          <a:lnRef idx="3">
+            <a:schemeClr val="dk1"/>
+          </a:lnRef>
+          <a:fillRef idx="0">
+            <a:schemeClr val="dk1"/>
+          </a:fillRef>
+          <a:effectRef idx="2">
+            <a:schemeClr val="dk1"/>
+          </a:effectRef>
+          <a:fontRef idx="minor">
+            <a:schemeClr val="tx1"/>
+          </a:fontRef>
+        </p:style>
+      </p:cxnSp>
+      <p:cxnSp>
+        <p:nvCxnSpPr>
+          <p:cNvPr id="33" name="Conector recto de flecha 27">
+            <a:extLst>
+              <a:ext uri="{FF2B5EF4-FFF2-40B4-BE49-F238E27FC236}">
+                <a16:creationId xmlns:a16="http://schemas.microsoft.com/office/drawing/2014/main" id="{AB7CA7BC-3DC5-49B2-AD27-68759180D82F}"/>
+              </a:ext>
+            </a:extLst>
+          </p:cNvPr>
+          <p:cNvCxnSpPr>
+            <a:cxnSpLocks/>
+          </p:cNvCxnSpPr>
+          <p:nvPr/>
+        </p:nvCxnSpPr>
+        <p:spPr>
+          <a:xfrm flipV="1">
+            <a:off x="1817912" y="2104034"/>
+            <a:ext cx="1901681" cy="565941"/>
+          </a:xfrm>
+          <a:prstGeom prst="straightConnector1">
+            <a:avLst/>
+          </a:prstGeom>
+          <a:ln>
+            <a:tailEnd type="triangle"/>
+          </a:ln>
+        </p:spPr>
+        <p:style>
+          <a:lnRef idx="3">
+            <a:schemeClr val="dk1"/>
+          </a:lnRef>
+          <a:fillRef idx="0">
+            <a:schemeClr val="dk1"/>
+          </a:fillRef>
+          <a:effectRef idx="2">
+            <a:schemeClr val="dk1"/>
+          </a:effectRef>
+          <a:fontRef idx="minor">
+            <a:schemeClr val="tx1"/>
+          </a:fontRef>
+        </p:style>
+      </p:cxnSp>
+      <p:sp>
+        <p:nvSpPr>
+          <p:cNvPr id="40" name="CuadroTexto 38">
+            <a:extLst>
+              <a:ext uri="{FF2B5EF4-FFF2-40B4-BE49-F238E27FC236}">
+                <a16:creationId xmlns:a16="http://schemas.microsoft.com/office/drawing/2014/main" id="{C99B3DAD-207B-44DF-BB23-6D5F4214EE64}"/>
+              </a:ext>
+            </a:extLst>
+          </p:cNvPr>
+          <p:cNvSpPr txBox="1"/>
+          <p:nvPr/>
+        </p:nvSpPr>
+        <p:spPr>
+          <a:xfrm>
+            <a:off x="3485313" y="2377953"/>
+            <a:ext cx="681713" cy="307777"/>
+          </a:xfrm>
+          <a:prstGeom prst="rect">
+            <a:avLst/>
+          </a:prstGeom>
+          <a:noFill/>
+        </p:spPr>
+        <p:txBody>
+          <a:bodyPr wrap="square" rtlCol="0">
+            <a:spAutoFit/>
+          </a:bodyPr>
+          <a:lstStyle/>
+          <a:p>
+            <a:r>
+              <a:rPr lang="en-GB" sz="1400" dirty="0">
+                <a:latin typeface="Times New Roman" panose="02020603050405020304" pitchFamily="18" charset="0"/>
+                <a:cs typeface="Times New Roman" panose="02020603050405020304" pitchFamily="18" charset="0"/>
+              </a:rPr>
+              <a:t>H2</a:t>
+            </a:r>
+          </a:p>
+        </p:txBody>
+      </p:sp>
+      <p:sp>
+        <p:nvSpPr>
+          <p:cNvPr id="41" name="CuadroTexto 38">
+            <a:extLst>
+              <a:ext uri="{FF2B5EF4-FFF2-40B4-BE49-F238E27FC236}">
+                <a16:creationId xmlns:a16="http://schemas.microsoft.com/office/drawing/2014/main" id="{2CB920CD-5B31-4D2D-B94D-EEF144412C48}"/>
+              </a:ext>
+            </a:extLst>
+          </p:cNvPr>
+          <p:cNvSpPr txBox="1"/>
+          <p:nvPr/>
+        </p:nvSpPr>
+        <p:spPr>
+          <a:xfrm>
+            <a:off x="2419503" y="2125305"/>
+            <a:ext cx="681713" cy="307777"/>
+          </a:xfrm>
+          <a:prstGeom prst="rect">
+            <a:avLst/>
+          </a:prstGeom>
+          <a:noFill/>
+        </p:spPr>
+        <p:txBody>
+          <a:bodyPr wrap="square" rtlCol="0">
+            <a:spAutoFit/>
+          </a:bodyPr>
+          <a:lstStyle/>
+          <a:p>
+            <a:r>
+              <a:rPr lang="en-GB" sz="1400" dirty="0">
+                <a:latin typeface="Times New Roman" panose="02020603050405020304" pitchFamily="18" charset="0"/>
+                <a:cs typeface="Times New Roman" panose="02020603050405020304" pitchFamily="18" charset="0"/>
+              </a:rPr>
+              <a:t>H3</a:t>
+            </a:r>
+          </a:p>
+        </p:txBody>
+      </p:sp>
+      <p:sp>
+        <p:nvSpPr>
+          <p:cNvPr id="49" name="CuadroTexto 43">
+            <a:extLst>
+              <a:ext uri="{FF2B5EF4-FFF2-40B4-BE49-F238E27FC236}">
+                <a16:creationId xmlns:a16="http://schemas.microsoft.com/office/drawing/2014/main" id="{171FF525-397D-4F61-95C6-118D2157D00E}"/>
+              </a:ext>
+            </a:extLst>
+          </p:cNvPr>
+          <p:cNvSpPr txBox="1"/>
+          <p:nvPr/>
+        </p:nvSpPr>
+        <p:spPr>
+          <a:xfrm>
+            <a:off x="2814851" y="3057823"/>
+            <a:ext cx="734378" cy="307777"/>
+          </a:xfrm>
+          <a:prstGeom prst="rect">
+            <a:avLst/>
+          </a:prstGeom>
+          <a:noFill/>
+        </p:spPr>
+        <p:txBody>
+          <a:bodyPr wrap="square" rtlCol="0">
+            <a:spAutoFit/>
+          </a:bodyPr>
+          <a:lstStyle/>
+          <a:p>
+            <a:r>
+              <a:rPr lang="en-GB" sz="1400" dirty="0">
+                <a:latin typeface="Times New Roman" panose="02020603050405020304" pitchFamily="18" charset="0"/>
+                <a:cs typeface="Times New Roman" panose="02020603050405020304" pitchFamily="18" charset="0"/>
+              </a:rPr>
+              <a:t>H4</a:t>
+            </a:r>
+          </a:p>
+        </p:txBody>
+      </p:sp>
+    </p:spTree>
+    <p:extLst>
+      <p:ext uri="{BB962C8B-B14F-4D97-AF65-F5344CB8AC3E}">
+        <p14:creationId xmlns:p14="http://schemas.microsoft.com/office/powerpoint/2010/main" val="1475852139"/>
+      </p:ext>
+    </p:extLst>
+  </p:cSld>
+  <p:clrMapOvr>
+    <a:masterClrMapping/>
+  </p:clrMapOvr>
+</p:sld>
+</file>
+
 <file path=ppt/theme/theme1.xml><?xml version="1.0" encoding="utf-8"?>
 <a:theme xmlns:a="http://schemas.openxmlformats.org/drawingml/2006/main" name="Tema de Office">
   <a:themeElements>

</xml_diff>